<commit_message>
Added the rest of the testing videos
</commit_message>
<xml_diff>
--- a/write-up/Diagrams/Top-Down.pptx
+++ b/write-up/Diagrams/Top-Down.pptx
@@ -6,6 +6,10 @@
   </p:sldMasterIdLst>
   <p:sldIdLst>
     <p:sldId id="256" r:id="rId2"/>
+    <p:sldId id="257" r:id="rId3"/>
+    <p:sldId id="258" r:id="rId4"/>
+    <p:sldId id="259" r:id="rId5"/>
+    <p:sldId id="260" r:id="rId6"/>
   </p:sldIdLst>
   <p:sldSz cx="12192000" cy="6858000"/>
   <p:notesSz cx="6858000" cy="9144000"/>
@@ -104,6 +108,11 @@
       </a:defRPr>
     </a:lvl9pPr>
   </p:defaultTextStyle>
+  <p:extLst>
+    <p:ext uri="{EFAFB233-063F-42B5-8137-9DF3F51BA10A}">
+      <p15:sldGuideLst xmlns:p15="http://schemas.microsoft.com/office/powerpoint/2012/main"/>
+    </p:ext>
+  </p:extLst>
 </p:presentation>
 </file>
 
@@ -256,7 +265,7 @@
           <a:p>
             <a:fld id="{0BC9B863-35B5-422C-A2AD-E039E344556D}" type="datetimeFigureOut">
               <a:rPr lang="en-GB" smtClean="0"/>
-              <a:t>12/11/2024</a:t>
+              <a:t>27/01/2025</a:t>
             </a:fld>
             <a:endParaRPr lang="en-GB"/>
           </a:p>
@@ -456,7 +465,7 @@
           <a:p>
             <a:fld id="{0BC9B863-35B5-422C-A2AD-E039E344556D}" type="datetimeFigureOut">
               <a:rPr lang="en-GB" smtClean="0"/>
-              <a:t>12/11/2024</a:t>
+              <a:t>27/01/2025</a:t>
             </a:fld>
             <a:endParaRPr lang="en-GB"/>
           </a:p>
@@ -666,7 +675,7 @@
           <a:p>
             <a:fld id="{0BC9B863-35B5-422C-A2AD-E039E344556D}" type="datetimeFigureOut">
               <a:rPr lang="en-GB" smtClean="0"/>
-              <a:t>12/11/2024</a:t>
+              <a:t>27/01/2025</a:t>
             </a:fld>
             <a:endParaRPr lang="en-GB"/>
           </a:p>
@@ -866,7 +875,7 @@
           <a:p>
             <a:fld id="{0BC9B863-35B5-422C-A2AD-E039E344556D}" type="datetimeFigureOut">
               <a:rPr lang="en-GB" smtClean="0"/>
-              <a:t>12/11/2024</a:t>
+              <a:t>27/01/2025</a:t>
             </a:fld>
             <a:endParaRPr lang="en-GB"/>
           </a:p>
@@ -1142,7 +1151,7 @@
           <a:p>
             <a:fld id="{0BC9B863-35B5-422C-A2AD-E039E344556D}" type="datetimeFigureOut">
               <a:rPr lang="en-GB" smtClean="0"/>
-              <a:t>12/11/2024</a:t>
+              <a:t>27/01/2025</a:t>
             </a:fld>
             <a:endParaRPr lang="en-GB"/>
           </a:p>
@@ -1410,7 +1419,7 @@
           <a:p>
             <a:fld id="{0BC9B863-35B5-422C-A2AD-E039E344556D}" type="datetimeFigureOut">
               <a:rPr lang="en-GB" smtClean="0"/>
-              <a:t>12/11/2024</a:t>
+              <a:t>27/01/2025</a:t>
             </a:fld>
             <a:endParaRPr lang="en-GB"/>
           </a:p>
@@ -1825,7 +1834,7 @@
           <a:p>
             <a:fld id="{0BC9B863-35B5-422C-A2AD-E039E344556D}" type="datetimeFigureOut">
               <a:rPr lang="en-GB" smtClean="0"/>
-              <a:t>12/11/2024</a:t>
+              <a:t>27/01/2025</a:t>
             </a:fld>
             <a:endParaRPr lang="en-GB"/>
           </a:p>
@@ -1967,7 +1976,7 @@
           <a:p>
             <a:fld id="{0BC9B863-35B5-422C-A2AD-E039E344556D}" type="datetimeFigureOut">
               <a:rPr lang="en-GB" smtClean="0"/>
-              <a:t>12/11/2024</a:t>
+              <a:t>27/01/2025</a:t>
             </a:fld>
             <a:endParaRPr lang="en-GB"/>
           </a:p>
@@ -2080,7 +2089,7 @@
           <a:p>
             <a:fld id="{0BC9B863-35B5-422C-A2AD-E039E344556D}" type="datetimeFigureOut">
               <a:rPr lang="en-GB" smtClean="0"/>
-              <a:t>12/11/2024</a:t>
+              <a:t>27/01/2025</a:t>
             </a:fld>
             <a:endParaRPr lang="en-GB"/>
           </a:p>
@@ -2393,7 +2402,7 @@
           <a:p>
             <a:fld id="{0BC9B863-35B5-422C-A2AD-E039E344556D}" type="datetimeFigureOut">
               <a:rPr lang="en-GB" smtClean="0"/>
-              <a:t>12/11/2024</a:t>
+              <a:t>27/01/2025</a:t>
             </a:fld>
             <a:endParaRPr lang="en-GB"/>
           </a:p>
@@ -2682,7 +2691,7 @@
           <a:p>
             <a:fld id="{0BC9B863-35B5-422C-A2AD-E039E344556D}" type="datetimeFigureOut">
               <a:rPr lang="en-GB" smtClean="0"/>
-              <a:t>12/11/2024</a:t>
+              <a:t>27/01/2025</a:t>
             </a:fld>
             <a:endParaRPr lang="en-GB"/>
           </a:p>
@@ -2925,7 +2934,7 @@
           <a:p>
             <a:fld id="{0BC9B863-35B5-422C-A2AD-E039E344556D}" type="datetimeFigureOut">
               <a:rPr lang="en-GB" smtClean="0"/>
-              <a:t>12/11/2024</a:t>
+              <a:t>27/01/2025</a:t>
             </a:fld>
             <a:endParaRPr lang="en-GB"/>
           </a:p>
@@ -3344,376 +3353,115 @@
       </p:grpSpPr>
       <p:sp>
         <p:nvSpPr>
-          <p:cNvPr id="4" name="TextBox 3">
-            <a:extLst>
-              <a:ext uri="{FF2B5EF4-FFF2-40B4-BE49-F238E27FC236}">
-                <a16:creationId xmlns:a16="http://schemas.microsoft.com/office/drawing/2014/main" id="{5970C3E0-6315-762A-3E14-6A01A09695A3}"/>
-              </a:ext>
-            </a:extLst>
-          </p:cNvPr>
-          <p:cNvSpPr txBox="1"/>
+          <p:cNvPr id="2" name="Title 1">
+            <a:extLst>
+              <a:ext uri="{FF2B5EF4-FFF2-40B4-BE49-F238E27FC236}">
+                <a16:creationId xmlns:a16="http://schemas.microsoft.com/office/drawing/2014/main" id="{E421301F-E8EB-284B-A2EB-B85595A7D251}"/>
+              </a:ext>
+            </a:extLst>
+          </p:cNvPr>
+          <p:cNvSpPr>
+            <a:spLocks noGrp="1"/>
+          </p:cNvSpPr>
+          <p:nvPr>
+            <p:ph type="ctrTitle"/>
+          </p:nvPr>
+        </p:nvSpPr>
+        <p:spPr/>
+        <p:txBody>
+          <a:bodyPr/>
+          <a:lstStyle/>
+          <a:p>
+            <a:r>
+              <a:rPr lang="en-GB" dirty="0"/>
+              <a:t>Top-Down Diagram</a:t>
+            </a:r>
+          </a:p>
+        </p:txBody>
+      </p:sp>
+      <p:sp>
+        <p:nvSpPr>
+          <p:cNvPr id="3" name="Subtitle 2">
+            <a:extLst>
+              <a:ext uri="{FF2B5EF4-FFF2-40B4-BE49-F238E27FC236}">
+                <a16:creationId xmlns:a16="http://schemas.microsoft.com/office/drawing/2014/main" id="{12C1FB06-442A-C0EA-4DAE-243D69EEA986}"/>
+              </a:ext>
+            </a:extLst>
+          </p:cNvPr>
+          <p:cNvSpPr>
+            <a:spLocks noGrp="1"/>
+          </p:cNvSpPr>
+          <p:nvPr>
+            <p:ph type="subTitle" idx="1"/>
+          </p:nvPr>
+        </p:nvSpPr>
+        <p:spPr/>
+        <p:txBody>
+          <a:bodyPr/>
+          <a:lstStyle/>
+          <a:p>
+            <a:r>
+              <a:rPr lang="en-GB" dirty="0"/>
+              <a:t>(I won’t need inheritance for the code)</a:t>
+            </a:r>
+          </a:p>
+        </p:txBody>
+      </p:sp>
+    </p:spTree>
+    <p:extLst>
+      <p:ext uri="{BB962C8B-B14F-4D97-AF65-F5344CB8AC3E}">
+        <p14:creationId xmlns:p14="http://schemas.microsoft.com/office/powerpoint/2010/main" val="3649023905"/>
+      </p:ext>
+    </p:extLst>
+  </p:cSld>
+  <p:clrMapOvr>
+    <a:masterClrMapping/>
+  </p:clrMapOvr>
+</p:sld>
+</file>
+
+<file path=ppt/slides/slide2.xml><?xml version="1.0" encoding="utf-8"?>
+<p:sld xmlns:a="http://schemas.openxmlformats.org/drawingml/2006/main" xmlns:r="http://schemas.openxmlformats.org/officeDocument/2006/relationships" xmlns:p="http://schemas.openxmlformats.org/presentationml/2006/main">
+  <p:cSld>
+    <p:spTree>
+      <p:nvGrpSpPr>
+        <p:cNvPr id="1" name=""/>
+        <p:cNvGrpSpPr/>
+        <p:nvPr/>
+      </p:nvGrpSpPr>
+      <p:grpSpPr>
+        <a:xfrm>
+          <a:off x="0" y="0"/>
+          <a:ext cx="0" cy="0"/>
+          <a:chOff x="0" y="0"/>
+          <a:chExt cx="0" cy="0"/>
+        </a:xfrm>
+      </p:grpSpPr>
+      <p:sp>
+        <p:nvSpPr>
+          <p:cNvPr id="2" name="Rectangle 1">
+            <a:extLst>
+              <a:ext uri="{FF2B5EF4-FFF2-40B4-BE49-F238E27FC236}">
+                <a16:creationId xmlns:a16="http://schemas.microsoft.com/office/drawing/2014/main" id="{D86BF3A1-CE90-3E88-4636-54695EF29CA2}"/>
+              </a:ext>
+            </a:extLst>
+          </p:cNvPr>
+          <p:cNvSpPr/>
           <p:nvPr/>
         </p:nvSpPr>
         <p:spPr>
           <a:xfrm>
-            <a:off x="4996961" y="219807"/>
-            <a:ext cx="2198077" cy="408623"/>
-          </a:xfrm>
-          <a:prstGeom prst="roundRect">
-            <a:avLst>
-              <a:gd name="adj" fmla="val 44639"/>
-            </a:avLst>
-          </a:prstGeom>
-          <a:solidFill>
-            <a:schemeClr val="tx2">
-              <a:lumMod val="50000"/>
-              <a:lumOff val="50000"/>
-            </a:schemeClr>
-          </a:solidFill>
-        </p:spPr>
-        <p:txBody>
-          <a:bodyPr wrap="square" rtlCol="0">
-            <a:spAutoFit/>
-          </a:bodyPr>
-          <a:lstStyle/>
-          <a:p>
-            <a:pPr algn="ctr"/>
-            <a:r>
-              <a:rPr lang="en-GB" dirty="0"/>
-              <a:t>Chess Engine</a:t>
-            </a:r>
-          </a:p>
-        </p:txBody>
-      </p:sp>
-      <p:cxnSp>
-        <p:nvCxnSpPr>
-          <p:cNvPr id="6" name="Straight Arrow Connector 5">
-            <a:extLst>
-              <a:ext uri="{FF2B5EF4-FFF2-40B4-BE49-F238E27FC236}">
-                <a16:creationId xmlns:a16="http://schemas.microsoft.com/office/drawing/2014/main" id="{ABCF4EB9-9E06-6841-4FA7-82F48A0DC9FF}"/>
-              </a:ext>
-            </a:extLst>
-          </p:cNvPr>
-          <p:cNvCxnSpPr>
-            <a:cxnSpLocks/>
-            <a:stCxn id="4" idx="2"/>
-            <a:endCxn id="11" idx="0"/>
-          </p:cNvCxnSpPr>
-          <p:nvPr/>
-        </p:nvCxnSpPr>
-        <p:spPr>
-          <a:xfrm flipH="1">
-            <a:off x="2945423" y="628430"/>
-            <a:ext cx="3150577" cy="468923"/>
-          </a:xfrm>
-          <a:prstGeom prst="straightConnector1">
-            <a:avLst/>
-          </a:prstGeom>
-          <a:ln>
-            <a:tailEnd type="triangle"/>
-          </a:ln>
-        </p:spPr>
-        <p:style>
-          <a:lnRef idx="2">
-            <a:schemeClr val="accent1"/>
-          </a:lnRef>
-          <a:fillRef idx="0">
-            <a:schemeClr val="accent1"/>
-          </a:fillRef>
-          <a:effectRef idx="1">
-            <a:schemeClr val="accent1"/>
-          </a:effectRef>
-          <a:fontRef idx="minor">
-            <a:schemeClr val="tx1"/>
-          </a:fontRef>
-        </p:style>
-      </p:cxnSp>
-      <p:cxnSp>
-        <p:nvCxnSpPr>
-          <p:cNvPr id="7" name="Straight Arrow Connector 6">
-            <a:extLst>
-              <a:ext uri="{FF2B5EF4-FFF2-40B4-BE49-F238E27FC236}">
-                <a16:creationId xmlns:a16="http://schemas.microsoft.com/office/drawing/2014/main" id="{76E5740C-E208-0475-9A74-C0237C891C8C}"/>
-              </a:ext>
-            </a:extLst>
-          </p:cNvPr>
-          <p:cNvCxnSpPr>
-            <a:cxnSpLocks/>
-            <a:stCxn id="4" idx="2"/>
-            <a:endCxn id="12" idx="0"/>
-          </p:cNvCxnSpPr>
-          <p:nvPr/>
-        </p:nvCxnSpPr>
-        <p:spPr>
-          <a:xfrm>
-            <a:off x="6096000" y="628430"/>
-            <a:ext cx="3150578" cy="468923"/>
-          </a:xfrm>
-          <a:prstGeom prst="straightConnector1">
-            <a:avLst/>
-          </a:prstGeom>
-          <a:ln>
-            <a:tailEnd type="triangle"/>
-          </a:ln>
-        </p:spPr>
-        <p:style>
-          <a:lnRef idx="2">
-            <a:schemeClr val="accent1"/>
-          </a:lnRef>
-          <a:fillRef idx="0">
-            <a:schemeClr val="accent1"/>
-          </a:fillRef>
-          <a:effectRef idx="1">
-            <a:schemeClr val="accent1"/>
-          </a:effectRef>
-          <a:fontRef idx="minor">
-            <a:schemeClr val="tx1"/>
-          </a:fontRef>
-        </p:style>
-      </p:cxnSp>
-      <p:sp>
-        <p:nvSpPr>
-          <p:cNvPr id="11" name="TextBox 10">
-            <a:extLst>
-              <a:ext uri="{FF2B5EF4-FFF2-40B4-BE49-F238E27FC236}">
-                <a16:creationId xmlns:a16="http://schemas.microsoft.com/office/drawing/2014/main" id="{57538F4E-292F-A5AC-CA70-8E1D0AC6EDA3}"/>
-              </a:ext>
-            </a:extLst>
-          </p:cNvPr>
-          <p:cNvSpPr txBox="1"/>
-          <p:nvPr/>
-        </p:nvSpPr>
-        <p:spPr>
-          <a:xfrm>
-            <a:off x="1846384" y="1097353"/>
-            <a:ext cx="2198077" cy="497919"/>
-          </a:xfrm>
-          <a:prstGeom prst="roundRect">
-            <a:avLst>
-              <a:gd name="adj" fmla="val 44639"/>
-            </a:avLst>
-          </a:prstGeom>
-          <a:solidFill>
-            <a:schemeClr val="tx2">
-              <a:lumMod val="50000"/>
-              <a:lumOff val="50000"/>
-            </a:schemeClr>
-          </a:solidFill>
-        </p:spPr>
-        <p:txBody>
-          <a:bodyPr wrap="square" rtlCol="0">
-            <a:spAutoFit/>
-          </a:bodyPr>
-          <a:lstStyle/>
-          <a:p>
-            <a:pPr algn="ctr"/>
-            <a:r>
-              <a:rPr lang="en-GB" dirty="0"/>
-              <a:t>Functionality</a:t>
-            </a:r>
-          </a:p>
-        </p:txBody>
-      </p:sp>
-      <p:sp>
-        <p:nvSpPr>
-          <p:cNvPr id="12" name="TextBox 11">
-            <a:extLst>
-              <a:ext uri="{FF2B5EF4-FFF2-40B4-BE49-F238E27FC236}">
-                <a16:creationId xmlns:a16="http://schemas.microsoft.com/office/drawing/2014/main" id="{8A029F27-F165-E60D-7A2C-DACE2C302464}"/>
-              </a:ext>
-            </a:extLst>
-          </p:cNvPr>
-          <p:cNvSpPr txBox="1"/>
-          <p:nvPr/>
-        </p:nvSpPr>
-        <p:spPr>
-          <a:xfrm>
-            <a:off x="8147539" y="1097353"/>
-            <a:ext cx="2198077" cy="497919"/>
-          </a:xfrm>
-          <a:prstGeom prst="roundRect">
-            <a:avLst>
-              <a:gd name="adj" fmla="val 44639"/>
-            </a:avLst>
-          </a:prstGeom>
-          <a:solidFill>
-            <a:schemeClr val="tx2">
-              <a:lumMod val="50000"/>
-              <a:lumOff val="50000"/>
-            </a:schemeClr>
-          </a:solidFill>
-        </p:spPr>
-        <p:txBody>
-          <a:bodyPr wrap="square" rtlCol="0">
-            <a:spAutoFit/>
-          </a:bodyPr>
-          <a:lstStyle/>
-          <a:p>
-            <a:pPr algn="ctr"/>
-            <a:r>
-              <a:rPr lang="en-GB" dirty="0"/>
-              <a:t>Graphics</a:t>
-            </a:r>
-          </a:p>
-        </p:txBody>
-      </p:sp>
-      <p:sp>
-        <p:nvSpPr>
-          <p:cNvPr id="15" name="TextBox 14">
-            <a:extLst>
-              <a:ext uri="{FF2B5EF4-FFF2-40B4-BE49-F238E27FC236}">
-                <a16:creationId xmlns:a16="http://schemas.microsoft.com/office/drawing/2014/main" id="{ADB53C14-9A85-7E36-A5FE-DCF2BD5C21EA}"/>
-              </a:ext>
-            </a:extLst>
-          </p:cNvPr>
-          <p:cNvSpPr txBox="1"/>
-          <p:nvPr/>
-        </p:nvSpPr>
-        <p:spPr>
-          <a:xfrm>
-            <a:off x="934915" y="1816012"/>
-            <a:ext cx="1227993" cy="497919"/>
-          </a:xfrm>
-          <a:prstGeom prst="roundRect">
-            <a:avLst>
-              <a:gd name="adj" fmla="val 44639"/>
-            </a:avLst>
-          </a:prstGeom>
-          <a:solidFill>
-            <a:schemeClr val="tx2">
-              <a:lumMod val="50000"/>
-              <a:lumOff val="50000"/>
-            </a:schemeClr>
-          </a:solidFill>
-        </p:spPr>
-        <p:txBody>
-          <a:bodyPr wrap="square" rtlCol="0">
-            <a:spAutoFit/>
-          </a:bodyPr>
-          <a:lstStyle/>
-          <a:p>
-            <a:pPr algn="ctr"/>
-            <a:r>
-              <a:rPr lang="en-GB" dirty="0"/>
-              <a:t>Logic</a:t>
-            </a:r>
-          </a:p>
-        </p:txBody>
-      </p:sp>
-      <p:sp>
-        <p:nvSpPr>
-          <p:cNvPr id="17" name="TextBox 16">
-            <a:extLst>
-              <a:ext uri="{FF2B5EF4-FFF2-40B4-BE49-F238E27FC236}">
-                <a16:creationId xmlns:a16="http://schemas.microsoft.com/office/drawing/2014/main" id="{FD5586BC-1BED-3711-57FC-B81657079455}"/>
-              </a:ext>
-            </a:extLst>
-          </p:cNvPr>
-          <p:cNvSpPr txBox="1"/>
-          <p:nvPr/>
-        </p:nvSpPr>
-        <p:spPr>
-          <a:xfrm>
-            <a:off x="2331425" y="1815235"/>
-            <a:ext cx="1227993" cy="497919"/>
-          </a:xfrm>
-          <a:prstGeom prst="roundRect">
-            <a:avLst>
-              <a:gd name="adj" fmla="val 44639"/>
-            </a:avLst>
-          </a:prstGeom>
-          <a:solidFill>
-            <a:schemeClr val="tx2">
-              <a:lumMod val="50000"/>
-              <a:lumOff val="50000"/>
-            </a:schemeClr>
-          </a:solidFill>
-        </p:spPr>
-        <p:txBody>
-          <a:bodyPr wrap="square" rtlCol="0">
-            <a:spAutoFit/>
-          </a:bodyPr>
-          <a:lstStyle/>
-          <a:p>
-            <a:pPr algn="ctr"/>
-            <a:r>
-              <a:rPr lang="en-GB" dirty="0"/>
-              <a:t>Inputs</a:t>
-            </a:r>
-          </a:p>
-        </p:txBody>
-      </p:sp>
-      <p:sp>
-        <p:nvSpPr>
-          <p:cNvPr id="18" name="TextBox 17">
-            <a:extLst>
-              <a:ext uri="{FF2B5EF4-FFF2-40B4-BE49-F238E27FC236}">
-                <a16:creationId xmlns:a16="http://schemas.microsoft.com/office/drawing/2014/main" id="{FBAD32B7-816C-77F1-279A-E7C90689CCED}"/>
-              </a:ext>
-            </a:extLst>
-          </p:cNvPr>
-          <p:cNvSpPr txBox="1"/>
-          <p:nvPr/>
-        </p:nvSpPr>
-        <p:spPr>
-          <a:xfrm>
-            <a:off x="3727935" y="1815235"/>
-            <a:ext cx="1227993" cy="497919"/>
-          </a:xfrm>
-          <a:prstGeom prst="roundRect">
-            <a:avLst>
-              <a:gd name="adj" fmla="val 44639"/>
-            </a:avLst>
-          </a:prstGeom>
-          <a:solidFill>
-            <a:schemeClr val="tx2">
-              <a:lumMod val="50000"/>
-              <a:lumOff val="50000"/>
-            </a:schemeClr>
-          </a:solidFill>
-        </p:spPr>
-        <p:txBody>
-          <a:bodyPr wrap="square" rtlCol="0">
-            <a:spAutoFit/>
-          </a:bodyPr>
-          <a:lstStyle/>
-          <a:p>
-            <a:pPr algn="ctr"/>
-            <a:r>
-              <a:rPr lang="en-GB" dirty="0"/>
-              <a:t>Outputs</a:t>
-            </a:r>
-          </a:p>
-        </p:txBody>
-      </p:sp>
-      <p:sp>
-        <p:nvSpPr>
-          <p:cNvPr id="19" name="Rectangle 18">
-            <a:extLst>
-              <a:ext uri="{FF2B5EF4-FFF2-40B4-BE49-F238E27FC236}">
-                <a16:creationId xmlns:a16="http://schemas.microsoft.com/office/drawing/2014/main" id="{FEDF1E0F-B749-1087-26C6-93893019F30F}"/>
-              </a:ext>
-            </a:extLst>
-          </p:cNvPr>
-          <p:cNvSpPr/>
-          <p:nvPr/>
-        </p:nvSpPr>
-        <p:spPr>
-          <a:xfrm>
-            <a:off x="934915" y="2602523"/>
-            <a:ext cx="1227993" cy="4149969"/>
+            <a:off x="2601057" y="962757"/>
+            <a:ext cx="6989885" cy="4932485"/>
           </a:xfrm>
           <a:prstGeom prst="rect">
             <a:avLst/>
           </a:prstGeom>
-          <a:solidFill>
-            <a:schemeClr val="tx2">
-              <a:lumMod val="50000"/>
-              <a:lumOff val="50000"/>
-            </a:schemeClr>
-          </a:solidFill>
-          <a:ln>
-            <a:noFill/>
+          <a:noFill/>
+          <a:ln w="38100">
+            <a:solidFill>
+              <a:schemeClr val="tx1"/>
+            </a:solidFill>
           </a:ln>
         </p:spPr>
         <p:style>
@@ -3737,75 +3485,342 @@
           <a:lstStyle/>
           <a:p>
             <a:pPr algn="ctr"/>
-            <a:r>
-              <a:rPr lang="en-GB" sz="1200" dirty="0"/>
-              <a:t>Turn-based system, linked around a Boolean flag (</a:t>
-            </a:r>
-            <a:r>
-              <a:rPr lang="en-GB" sz="1200" dirty="0" err="1"/>
-              <a:t>whiteToMove</a:t>
-            </a:r>
-            <a:r>
-              <a:rPr lang="en-GB" sz="1200" dirty="0"/>
-              <a:t>)</a:t>
-            </a:r>
-          </a:p>
-          <a:p>
-            <a:pPr algn="ctr"/>
-            <a:endParaRPr lang="en-GB" sz="1200" dirty="0"/>
-          </a:p>
-          <a:p>
-            <a:pPr algn="ctr"/>
-            <a:r>
-              <a:rPr lang="en-GB" sz="1200" dirty="0" err="1"/>
-              <a:t>moves.py</a:t>
-            </a:r>
-            <a:r>
-              <a:rPr lang="en-GB" sz="1200" dirty="0"/>
-              <a:t> file used to ensure that all the possible moves are available and any illegal moves can’t be played</a:t>
-            </a:r>
-          </a:p>
-          <a:p>
-            <a:pPr algn="ctr"/>
-            <a:endParaRPr lang="en-GB" sz="1200" dirty="0"/>
-          </a:p>
-          <a:p>
-            <a:pPr algn="ctr"/>
-            <a:r>
-              <a:rPr lang="en-GB" sz="1200" dirty="0"/>
-              <a:t>Pygame events system detects keyboard and mouse clicks and links them to pre-defined events</a:t>
-            </a:r>
-          </a:p>
-        </p:txBody>
-      </p:sp>
-      <p:sp>
-        <p:nvSpPr>
-          <p:cNvPr id="20" name="Rectangle 19">
-            <a:extLst>
-              <a:ext uri="{FF2B5EF4-FFF2-40B4-BE49-F238E27FC236}">
-                <a16:creationId xmlns:a16="http://schemas.microsoft.com/office/drawing/2014/main" id="{90CE2A37-3668-4804-1475-266E3B7AF6E1}"/>
-              </a:ext>
-            </a:extLst>
-          </p:cNvPr>
-          <p:cNvSpPr/>
+            <a:endParaRPr lang="en-GB">
+              <a:solidFill>
+                <a:schemeClr val="tx1"/>
+              </a:solidFill>
+            </a:endParaRPr>
+          </a:p>
+        </p:txBody>
+      </p:sp>
+      <p:cxnSp>
+        <p:nvCxnSpPr>
+          <p:cNvPr id="4" name="Straight Connector 3">
+            <a:extLst>
+              <a:ext uri="{FF2B5EF4-FFF2-40B4-BE49-F238E27FC236}">
+                <a16:creationId xmlns:a16="http://schemas.microsoft.com/office/drawing/2014/main" id="{D237B332-0EE7-2E03-3E49-935D689FB28F}"/>
+              </a:ext>
+            </a:extLst>
+          </p:cNvPr>
+          <p:cNvCxnSpPr/>
+          <p:nvPr/>
+        </p:nvCxnSpPr>
+        <p:spPr>
+          <a:xfrm flipH="1">
+            <a:off x="2611315" y="1767254"/>
+            <a:ext cx="6972300" cy="0"/>
+          </a:xfrm>
+          <a:prstGeom prst="line">
+            <a:avLst/>
+          </a:prstGeom>
+          <a:ln w="38100">
+            <a:solidFill>
+              <a:schemeClr val="tx1"/>
+            </a:solidFill>
+          </a:ln>
+        </p:spPr>
+        <p:style>
+          <a:lnRef idx="2">
+            <a:schemeClr val="accent1"/>
+          </a:lnRef>
+          <a:fillRef idx="0">
+            <a:schemeClr val="accent1"/>
+          </a:fillRef>
+          <a:effectRef idx="1">
+            <a:schemeClr val="accent1"/>
+          </a:effectRef>
+          <a:fontRef idx="minor">
+            <a:schemeClr val="tx1"/>
+          </a:fontRef>
+        </p:style>
+      </p:cxnSp>
+      <p:sp>
+        <p:nvSpPr>
+          <p:cNvPr id="5" name="TextBox 4">
+            <a:extLst>
+              <a:ext uri="{FF2B5EF4-FFF2-40B4-BE49-F238E27FC236}">
+                <a16:creationId xmlns:a16="http://schemas.microsoft.com/office/drawing/2014/main" id="{81BD284F-1E4C-CBBB-7C1D-5365FA6B990C}"/>
+              </a:ext>
+            </a:extLst>
+          </p:cNvPr>
+          <p:cNvSpPr txBox="1"/>
           <p:nvPr/>
         </p:nvSpPr>
         <p:spPr>
           <a:xfrm>
-            <a:off x="2331425" y="2602523"/>
-            <a:ext cx="1227993" cy="4149969"/>
+            <a:off x="2601057" y="962757"/>
+            <a:ext cx="6989885" cy="769441"/>
           </a:xfrm>
           <a:prstGeom prst="rect">
             <a:avLst/>
           </a:prstGeom>
-          <a:solidFill>
-            <a:schemeClr val="tx2">
-              <a:lumMod val="50000"/>
-              <a:lumOff val="50000"/>
-            </a:schemeClr>
-          </a:solidFill>
-          <a:ln>
-            <a:noFill/>
+          <a:noFill/>
+        </p:spPr>
+        <p:txBody>
+          <a:bodyPr wrap="square" rtlCol="0">
+            <a:spAutoFit/>
+          </a:bodyPr>
+          <a:lstStyle/>
+          <a:p>
+            <a:pPr algn="ctr"/>
+            <a:r>
+              <a:rPr lang="en-GB" sz="4400" dirty="0"/>
+              <a:t>Main</a:t>
+            </a:r>
+          </a:p>
+        </p:txBody>
+      </p:sp>
+      <p:sp>
+        <p:nvSpPr>
+          <p:cNvPr id="6" name="TextBox 5">
+            <a:extLst>
+              <a:ext uri="{FF2B5EF4-FFF2-40B4-BE49-F238E27FC236}">
+                <a16:creationId xmlns:a16="http://schemas.microsoft.com/office/drawing/2014/main" id="{C4E8A6F7-7D2C-03C2-7433-8CDD17D9B653}"/>
+              </a:ext>
+            </a:extLst>
+          </p:cNvPr>
+          <p:cNvSpPr txBox="1"/>
+          <p:nvPr/>
+        </p:nvSpPr>
+        <p:spPr>
+          <a:xfrm>
+            <a:off x="2601057" y="1802311"/>
+            <a:ext cx="6972300" cy="1754326"/>
+          </a:xfrm>
+          <a:prstGeom prst="rect">
+            <a:avLst/>
+          </a:prstGeom>
+          <a:noFill/>
+        </p:spPr>
+        <p:txBody>
+          <a:bodyPr wrap="square" rtlCol="0">
+            <a:spAutoFit/>
+          </a:bodyPr>
+          <a:lstStyle/>
+          <a:p>
+            <a:r>
+              <a:rPr lang="en-GB" dirty="0"/>
+              <a:t>screen: </a:t>
+            </a:r>
+            <a:r>
+              <a:rPr lang="en-GB" dirty="0" err="1"/>
+              <a:t>pygame.display.set_mode</a:t>
+            </a:r>
+            <a:r>
+              <a:rPr lang="en-GB" dirty="0"/>
+              <a:t>()</a:t>
+            </a:r>
+          </a:p>
+          <a:p>
+            <a:r>
+              <a:rPr lang="en-GB" dirty="0"/>
+              <a:t>board: </a:t>
+            </a:r>
+            <a:r>
+              <a:rPr lang="en-GB" dirty="0" err="1"/>
+              <a:t>engine.get_board</a:t>
+            </a:r>
+            <a:r>
+              <a:rPr lang="en-GB" dirty="0"/>
+              <a:t>()</a:t>
+            </a:r>
+          </a:p>
+          <a:p>
+            <a:r>
+              <a:rPr lang="en-GB" dirty="0"/>
+              <a:t>pieces: Image Array</a:t>
+            </a:r>
+          </a:p>
+          <a:p>
+            <a:r>
+              <a:rPr lang="en-GB" dirty="0"/>
+              <a:t>clicks: Int</a:t>
+            </a:r>
+          </a:p>
+          <a:p>
+            <a:r>
+              <a:rPr lang="en-GB" dirty="0"/>
+              <a:t>squares: Int[]</a:t>
+            </a:r>
+          </a:p>
+          <a:p>
+            <a:r>
+              <a:rPr lang="en-GB" dirty="0" err="1"/>
+              <a:t>whiteToMove</a:t>
+            </a:r>
+            <a:r>
+              <a:rPr lang="en-GB" dirty="0"/>
+              <a:t>: Boolean</a:t>
+            </a:r>
+          </a:p>
+        </p:txBody>
+      </p:sp>
+      <p:cxnSp>
+        <p:nvCxnSpPr>
+          <p:cNvPr id="8" name="Straight Connector 7">
+            <a:extLst>
+              <a:ext uri="{FF2B5EF4-FFF2-40B4-BE49-F238E27FC236}">
+                <a16:creationId xmlns:a16="http://schemas.microsoft.com/office/drawing/2014/main" id="{7EED1010-54E8-1307-3DF8-23E5FA2FEC55}"/>
+              </a:ext>
+            </a:extLst>
+          </p:cNvPr>
+          <p:cNvCxnSpPr/>
+          <p:nvPr/>
+        </p:nvCxnSpPr>
+        <p:spPr>
+          <a:xfrm>
+            <a:off x="2601057" y="3569677"/>
+            <a:ext cx="6982558" cy="0"/>
+          </a:xfrm>
+          <a:prstGeom prst="line">
+            <a:avLst/>
+          </a:prstGeom>
+          <a:ln w="38100">
+            <a:solidFill>
+              <a:schemeClr val="tx1"/>
+            </a:solidFill>
+          </a:ln>
+        </p:spPr>
+        <p:style>
+          <a:lnRef idx="2">
+            <a:schemeClr val="accent1"/>
+          </a:lnRef>
+          <a:fillRef idx="0">
+            <a:schemeClr val="accent1"/>
+          </a:fillRef>
+          <a:effectRef idx="1">
+            <a:schemeClr val="accent1"/>
+          </a:effectRef>
+          <a:fontRef idx="minor">
+            <a:schemeClr val="tx1"/>
+          </a:fontRef>
+        </p:style>
+      </p:cxnSp>
+      <p:sp>
+        <p:nvSpPr>
+          <p:cNvPr id="9" name="TextBox 8">
+            <a:extLst>
+              <a:ext uri="{FF2B5EF4-FFF2-40B4-BE49-F238E27FC236}">
+                <a16:creationId xmlns:a16="http://schemas.microsoft.com/office/drawing/2014/main" id="{A75F823B-1002-4954-108C-0C8D51D930DB}"/>
+              </a:ext>
+            </a:extLst>
+          </p:cNvPr>
+          <p:cNvSpPr txBox="1"/>
+          <p:nvPr/>
+        </p:nvSpPr>
+        <p:spPr>
+          <a:xfrm>
+            <a:off x="2611315" y="3569677"/>
+            <a:ext cx="6962042" cy="1200329"/>
+          </a:xfrm>
+          <a:prstGeom prst="rect">
+            <a:avLst/>
+          </a:prstGeom>
+          <a:noFill/>
+        </p:spPr>
+        <p:txBody>
+          <a:bodyPr wrap="square" rtlCol="0">
+            <a:spAutoFit/>
+          </a:bodyPr>
+          <a:lstStyle/>
+          <a:p>
+            <a:r>
+              <a:rPr lang="en-GB" dirty="0"/>
+              <a:t>__</a:t>
+            </a:r>
+            <a:r>
+              <a:rPr lang="en-GB" dirty="0" err="1"/>
+              <a:t>init</a:t>
+            </a:r>
+            <a:r>
+              <a:rPr lang="en-GB" dirty="0"/>
+              <a:t>__</a:t>
+            </a:r>
+          </a:p>
+          <a:p>
+            <a:r>
+              <a:rPr lang="en-GB" dirty="0" err="1"/>
+              <a:t>mainLoop</a:t>
+            </a:r>
+            <a:endParaRPr lang="en-GB" dirty="0"/>
+          </a:p>
+          <a:p>
+            <a:r>
+              <a:rPr lang="en-GB" dirty="0" err="1"/>
+              <a:t>isCheckmate</a:t>
+            </a:r>
+            <a:endParaRPr lang="en-GB" dirty="0"/>
+          </a:p>
+          <a:p>
+            <a:r>
+              <a:rPr lang="en-GB" dirty="0" err="1"/>
+              <a:t>isStalemate</a:t>
+            </a:r>
+            <a:endParaRPr lang="en-GB" dirty="0"/>
+          </a:p>
+        </p:txBody>
+      </p:sp>
+    </p:spTree>
+    <p:extLst>
+      <p:ext uri="{BB962C8B-B14F-4D97-AF65-F5344CB8AC3E}">
+        <p14:creationId xmlns:p14="http://schemas.microsoft.com/office/powerpoint/2010/main" val="1805448083"/>
+      </p:ext>
+    </p:extLst>
+  </p:cSld>
+  <p:clrMapOvr>
+    <a:masterClrMapping/>
+  </p:clrMapOvr>
+</p:sld>
+</file>
+
+<file path=ppt/slides/slide3.xml><?xml version="1.0" encoding="utf-8"?>
+<p:sld xmlns:a="http://schemas.openxmlformats.org/drawingml/2006/main" xmlns:r="http://schemas.openxmlformats.org/officeDocument/2006/relationships" xmlns:p="http://schemas.openxmlformats.org/presentationml/2006/main">
+  <p:cSld>
+    <p:spTree>
+      <p:nvGrpSpPr>
+        <p:cNvPr id="1" name="">
+          <a:extLst>
+            <a:ext uri="{FF2B5EF4-FFF2-40B4-BE49-F238E27FC236}">
+              <a16:creationId xmlns:a16="http://schemas.microsoft.com/office/drawing/2014/main" id="{2970B8D2-B167-BBBC-0CCB-A3ED3685DBC2}"/>
+            </a:ext>
+          </a:extLst>
+        </p:cNvPr>
+        <p:cNvGrpSpPr/>
+        <p:nvPr/>
+      </p:nvGrpSpPr>
+      <p:grpSpPr>
+        <a:xfrm>
+          <a:off x="0" y="0"/>
+          <a:ext cx="0" cy="0"/>
+          <a:chOff x="0" y="0"/>
+          <a:chExt cx="0" cy="0"/>
+        </a:xfrm>
+      </p:grpSpPr>
+      <p:sp>
+        <p:nvSpPr>
+          <p:cNvPr id="2" name="Rectangle 1">
+            <a:extLst>
+              <a:ext uri="{FF2B5EF4-FFF2-40B4-BE49-F238E27FC236}">
+                <a16:creationId xmlns:a16="http://schemas.microsoft.com/office/drawing/2014/main" id="{4BFEC930-7417-B786-9E06-E860098C0E24}"/>
+              </a:ext>
+            </a:extLst>
+          </p:cNvPr>
+          <p:cNvSpPr/>
+          <p:nvPr/>
+        </p:nvSpPr>
+        <p:spPr>
+          <a:xfrm>
+            <a:off x="2601057" y="962757"/>
+            <a:ext cx="6989885" cy="4932485"/>
+          </a:xfrm>
+          <a:prstGeom prst="rect">
+            <a:avLst/>
+          </a:prstGeom>
+          <a:noFill/>
+          <a:ln w="38100">
+            <a:solidFill>
+              <a:schemeClr val="tx1"/>
+            </a:solidFill>
           </a:ln>
         </p:spPr>
         <p:style>
@@ -3829,17 +3844,992 @@
           <a:lstStyle/>
           <a:p>
             <a:pPr algn="ctr"/>
-            <a:r>
-              <a:rPr lang="en-GB" sz="1200" dirty="0"/>
-              <a:t>The main inputs are the keyboard and mouse (predominantly the mouse) as the ‘x’ key deselects whatever piece is selected, and the mouse is used to select, deselect and move pieces</a:t>
-            </a:r>
+            <a:endParaRPr lang="en-GB">
+              <a:solidFill>
+                <a:schemeClr val="tx1"/>
+              </a:solidFill>
+            </a:endParaRPr>
+          </a:p>
+        </p:txBody>
+      </p:sp>
+      <p:cxnSp>
+        <p:nvCxnSpPr>
+          <p:cNvPr id="4" name="Straight Connector 3">
+            <a:extLst>
+              <a:ext uri="{FF2B5EF4-FFF2-40B4-BE49-F238E27FC236}">
+                <a16:creationId xmlns:a16="http://schemas.microsoft.com/office/drawing/2014/main" id="{6FC860A9-095C-5BE9-F58C-FB13C442E485}"/>
+              </a:ext>
+            </a:extLst>
+          </p:cNvPr>
+          <p:cNvCxnSpPr/>
+          <p:nvPr/>
+        </p:nvCxnSpPr>
+        <p:spPr>
+          <a:xfrm flipH="1">
+            <a:off x="2611315" y="1767254"/>
+            <a:ext cx="6972300" cy="0"/>
+          </a:xfrm>
+          <a:prstGeom prst="line">
+            <a:avLst/>
+          </a:prstGeom>
+          <a:ln w="38100">
+            <a:solidFill>
+              <a:schemeClr val="tx1"/>
+            </a:solidFill>
+          </a:ln>
+        </p:spPr>
+        <p:style>
+          <a:lnRef idx="2">
+            <a:schemeClr val="accent1"/>
+          </a:lnRef>
+          <a:fillRef idx="0">
+            <a:schemeClr val="accent1"/>
+          </a:fillRef>
+          <a:effectRef idx="1">
+            <a:schemeClr val="accent1"/>
+          </a:effectRef>
+          <a:fontRef idx="minor">
+            <a:schemeClr val="tx1"/>
+          </a:fontRef>
+        </p:style>
+      </p:cxnSp>
+      <p:sp>
+        <p:nvSpPr>
+          <p:cNvPr id="5" name="TextBox 4">
+            <a:extLst>
+              <a:ext uri="{FF2B5EF4-FFF2-40B4-BE49-F238E27FC236}">
+                <a16:creationId xmlns:a16="http://schemas.microsoft.com/office/drawing/2014/main" id="{915ABEA4-B565-5DA0-C6D9-C4153D9D284A}"/>
+              </a:ext>
+            </a:extLst>
+          </p:cNvPr>
+          <p:cNvSpPr txBox="1"/>
+          <p:nvPr/>
+        </p:nvSpPr>
+        <p:spPr>
+          <a:xfrm>
+            <a:off x="2601057" y="962757"/>
+            <a:ext cx="6989885" cy="769441"/>
+          </a:xfrm>
+          <a:prstGeom prst="rect">
+            <a:avLst/>
+          </a:prstGeom>
+          <a:noFill/>
+        </p:spPr>
+        <p:txBody>
+          <a:bodyPr wrap="square" rtlCol="0">
+            <a:spAutoFit/>
+          </a:bodyPr>
+          <a:lstStyle/>
+          <a:p>
+            <a:pPr algn="ctr"/>
+            <a:r>
+              <a:rPr lang="en-GB" sz="4400" dirty="0"/>
+              <a:t>Moves</a:t>
+            </a:r>
+          </a:p>
+        </p:txBody>
+      </p:sp>
+      <p:sp>
+        <p:nvSpPr>
+          <p:cNvPr id="6" name="TextBox 5">
+            <a:extLst>
+              <a:ext uri="{FF2B5EF4-FFF2-40B4-BE49-F238E27FC236}">
+                <a16:creationId xmlns:a16="http://schemas.microsoft.com/office/drawing/2014/main" id="{5FC08491-B42B-EE32-E28A-1C298787A2EF}"/>
+              </a:ext>
+            </a:extLst>
+          </p:cNvPr>
+          <p:cNvSpPr txBox="1"/>
+          <p:nvPr/>
+        </p:nvSpPr>
+        <p:spPr>
+          <a:xfrm>
+            <a:off x="2601057" y="1802311"/>
+            <a:ext cx="6972300" cy="1477328"/>
+          </a:xfrm>
+          <a:prstGeom prst="rect">
+            <a:avLst/>
+          </a:prstGeom>
+          <a:noFill/>
+        </p:spPr>
+        <p:txBody>
+          <a:bodyPr wrap="square" rtlCol="0">
+            <a:spAutoFit/>
+          </a:bodyPr>
+          <a:lstStyle/>
+          <a:p>
+            <a:r>
+              <a:rPr lang="en-GB" dirty="0" err="1"/>
+              <a:t>wKingLocation</a:t>
+            </a:r>
+            <a:r>
+              <a:rPr lang="en-GB" dirty="0"/>
+              <a:t>: Int[]</a:t>
+            </a:r>
+          </a:p>
+          <a:p>
+            <a:r>
+              <a:rPr lang="en-GB" dirty="0" err="1"/>
+              <a:t>bKingLocation</a:t>
+            </a:r>
+            <a:r>
+              <a:rPr lang="en-GB" dirty="0"/>
+              <a:t>: Int[]</a:t>
+            </a:r>
+          </a:p>
+          <a:p>
+            <a:r>
+              <a:rPr lang="en-GB" dirty="0"/>
+              <a:t>w/</a:t>
+            </a:r>
+            <a:r>
+              <a:rPr lang="en-GB" dirty="0" err="1"/>
+              <a:t>bKingHasMoved</a:t>
+            </a:r>
+            <a:r>
+              <a:rPr lang="en-GB" dirty="0"/>
+              <a:t>: Boolean</a:t>
+            </a:r>
+          </a:p>
+          <a:p>
+            <a:r>
+              <a:rPr lang="en-GB" dirty="0"/>
+              <a:t>w/</a:t>
+            </a:r>
+            <a:r>
+              <a:rPr lang="en-GB" dirty="0" err="1"/>
+              <a:t>bRook1HasMoved</a:t>
+            </a:r>
+            <a:r>
+              <a:rPr lang="en-GB" dirty="0"/>
+              <a:t>: Boolean</a:t>
+            </a:r>
+          </a:p>
+          <a:p>
+            <a:r>
+              <a:rPr lang="en-GB" dirty="0"/>
+              <a:t>w/</a:t>
+            </a:r>
+            <a:r>
+              <a:rPr lang="en-GB" dirty="0" err="1"/>
+              <a:t>bRook2HasMoved:Boolean</a:t>
+            </a:r>
+            <a:endParaRPr lang="en-GB" dirty="0"/>
+          </a:p>
+        </p:txBody>
+      </p:sp>
+      <p:cxnSp>
+        <p:nvCxnSpPr>
+          <p:cNvPr id="8" name="Straight Connector 7">
+            <a:extLst>
+              <a:ext uri="{FF2B5EF4-FFF2-40B4-BE49-F238E27FC236}">
+                <a16:creationId xmlns:a16="http://schemas.microsoft.com/office/drawing/2014/main" id="{D3CC4C50-8B09-3141-3169-0325B7BBF282}"/>
+              </a:ext>
+            </a:extLst>
+          </p:cNvPr>
+          <p:cNvCxnSpPr/>
+          <p:nvPr/>
+        </p:nvCxnSpPr>
+        <p:spPr>
+          <a:xfrm>
+            <a:off x="2601057" y="3297121"/>
+            <a:ext cx="6982558" cy="0"/>
+          </a:xfrm>
+          <a:prstGeom prst="line">
+            <a:avLst/>
+          </a:prstGeom>
+          <a:ln w="38100">
+            <a:solidFill>
+              <a:schemeClr val="tx1"/>
+            </a:solidFill>
+          </a:ln>
+        </p:spPr>
+        <p:style>
+          <a:lnRef idx="2">
+            <a:schemeClr val="accent1"/>
+          </a:lnRef>
+          <a:fillRef idx="0">
+            <a:schemeClr val="accent1"/>
+          </a:fillRef>
+          <a:effectRef idx="1">
+            <a:schemeClr val="accent1"/>
+          </a:effectRef>
+          <a:fontRef idx="minor">
+            <a:schemeClr val="tx1"/>
+          </a:fontRef>
+        </p:style>
+      </p:cxnSp>
+      <p:sp>
+        <p:nvSpPr>
+          <p:cNvPr id="9" name="TextBox 8">
+            <a:extLst>
+              <a:ext uri="{FF2B5EF4-FFF2-40B4-BE49-F238E27FC236}">
+                <a16:creationId xmlns:a16="http://schemas.microsoft.com/office/drawing/2014/main" id="{9579F045-02C8-A8D4-B7E5-0E1955DBECDB}"/>
+              </a:ext>
+            </a:extLst>
+          </p:cNvPr>
+          <p:cNvSpPr txBox="1"/>
+          <p:nvPr/>
+        </p:nvSpPr>
+        <p:spPr>
+          <a:xfrm>
+            <a:off x="2611315" y="3244340"/>
+            <a:ext cx="6962042" cy="2616101"/>
+          </a:xfrm>
+          <a:prstGeom prst="rect">
+            <a:avLst/>
+          </a:prstGeom>
+          <a:noFill/>
+        </p:spPr>
+        <p:txBody>
+          <a:bodyPr wrap="square" rtlCol="0">
+            <a:spAutoFit/>
+          </a:bodyPr>
+          <a:lstStyle/>
+          <a:p>
+            <a:r>
+              <a:rPr lang="en-GB" sz="1600" dirty="0"/>
+              <a:t>__</a:t>
+            </a:r>
+            <a:r>
+              <a:rPr lang="en-GB" sz="1600" dirty="0" err="1"/>
+              <a:t>init</a:t>
+            </a:r>
+            <a:r>
+              <a:rPr lang="en-GB" sz="1600" dirty="0"/>
+              <a:t>__                                    </a:t>
+            </a:r>
+            <a:r>
+              <a:rPr lang="en-GB" sz="1600" dirty="0" err="1"/>
+              <a:t>getKingMoves</a:t>
+            </a:r>
+            <a:endParaRPr lang="en-GB" sz="1600" dirty="0"/>
+          </a:p>
+          <a:p>
+            <a:r>
+              <a:rPr lang="en-GB" sz="1600" dirty="0" err="1"/>
+              <a:t>getKingLocation</a:t>
+            </a:r>
+            <a:r>
+              <a:rPr lang="en-GB" sz="1600" dirty="0"/>
+              <a:t>                 </a:t>
+            </a:r>
+            <a:r>
+              <a:rPr lang="en-GB" sz="1600" dirty="0" err="1"/>
+              <a:t>searchForPinsAndChecks</a:t>
+            </a:r>
+            <a:endParaRPr lang="en-GB" sz="1600" dirty="0"/>
+          </a:p>
+          <a:p>
+            <a:r>
+              <a:rPr lang="en-GB" sz="1600" dirty="0" err="1"/>
+              <a:t>getValidMoves</a:t>
+            </a:r>
+            <a:r>
+              <a:rPr lang="en-GB" sz="1600" dirty="0"/>
+              <a:t>                     </a:t>
+            </a:r>
+            <a:r>
+              <a:rPr lang="en-GB" sz="1600" dirty="0" err="1"/>
+              <a:t>findKnightChecks</a:t>
+            </a:r>
+            <a:endParaRPr lang="en-GB" sz="1600" dirty="0"/>
+          </a:p>
+          <a:p>
+            <a:r>
+              <a:rPr lang="en-GB" sz="1600" dirty="0" err="1"/>
+              <a:t>getAllPossibleMoves</a:t>
+            </a:r>
+            <a:r>
+              <a:rPr lang="en-GB" sz="1600" dirty="0"/>
+              <a:t>        </a:t>
+            </a:r>
+            <a:r>
+              <a:rPr lang="en-GB" sz="1600" dirty="0" err="1"/>
+              <a:t>findPawnChecks</a:t>
+            </a:r>
+            <a:endParaRPr lang="en-GB" sz="1600" dirty="0"/>
+          </a:p>
+          <a:p>
+            <a:r>
+              <a:rPr lang="en-GB" sz="1600" dirty="0"/>
+              <a:t>castling                                   </a:t>
+            </a:r>
+            <a:r>
+              <a:rPr lang="en-GB" sz="1600" dirty="0" err="1"/>
+              <a:t>findRookQueenChecks</a:t>
+            </a:r>
+            <a:endParaRPr lang="en-GB" sz="1600" dirty="0"/>
+          </a:p>
+          <a:p>
+            <a:r>
+              <a:rPr lang="en-GB" sz="1600" dirty="0" err="1"/>
+              <a:t>getPawnMoves</a:t>
+            </a:r>
+            <a:r>
+              <a:rPr lang="en-GB" sz="1600" dirty="0"/>
+              <a:t>                    </a:t>
+            </a:r>
+            <a:r>
+              <a:rPr lang="en-GB" sz="1600" dirty="0" err="1"/>
+              <a:t>findBishopQueenChecks</a:t>
+            </a:r>
+            <a:endParaRPr lang="en-GB" sz="1600" dirty="0"/>
+          </a:p>
+          <a:p>
+            <a:r>
+              <a:rPr lang="en-GB" sz="1600" dirty="0" err="1"/>
+              <a:t>getKnightMoves</a:t>
+            </a:r>
+            <a:endParaRPr lang="en-GB" sz="1600" dirty="0"/>
+          </a:p>
+          <a:p>
+            <a:r>
+              <a:rPr lang="en-GB" sz="1600" dirty="0" err="1"/>
+              <a:t>getBishopMoves</a:t>
+            </a:r>
+            <a:endParaRPr lang="en-GB" sz="1600" dirty="0"/>
+          </a:p>
+          <a:p>
+            <a:r>
+              <a:rPr lang="en-GB" sz="1600" dirty="0" err="1"/>
+              <a:t>getRookMoves</a:t>
+            </a:r>
+            <a:endParaRPr lang="en-GB" sz="1600" dirty="0"/>
+          </a:p>
+          <a:p>
+            <a:r>
+              <a:rPr lang="en-GB" sz="1600" dirty="0" err="1"/>
+              <a:t>getQueenMoves</a:t>
+            </a:r>
+            <a:endParaRPr lang="en-GB" sz="1600" dirty="0"/>
           </a:p>
         </p:txBody>
       </p:sp>
     </p:spTree>
     <p:extLst>
       <p:ext uri="{BB962C8B-B14F-4D97-AF65-F5344CB8AC3E}">
-        <p14:creationId xmlns:p14="http://schemas.microsoft.com/office/powerpoint/2010/main" val="1115848143"/>
+        <p14:creationId xmlns:p14="http://schemas.microsoft.com/office/powerpoint/2010/main" val="1297425653"/>
+      </p:ext>
+    </p:extLst>
+  </p:cSld>
+  <p:clrMapOvr>
+    <a:masterClrMapping/>
+  </p:clrMapOvr>
+</p:sld>
+</file>
+
+<file path=ppt/slides/slide4.xml><?xml version="1.0" encoding="utf-8"?>
+<p:sld xmlns:a="http://schemas.openxmlformats.org/drawingml/2006/main" xmlns:r="http://schemas.openxmlformats.org/officeDocument/2006/relationships" xmlns:p="http://schemas.openxmlformats.org/presentationml/2006/main">
+  <p:cSld>
+    <p:spTree>
+      <p:nvGrpSpPr>
+        <p:cNvPr id="1" name="">
+          <a:extLst>
+            <a:ext uri="{FF2B5EF4-FFF2-40B4-BE49-F238E27FC236}">
+              <a16:creationId xmlns:a16="http://schemas.microsoft.com/office/drawing/2014/main" id="{88BD316F-8979-4F2E-E679-EDC4FAA41F1D}"/>
+            </a:ext>
+          </a:extLst>
+        </p:cNvPr>
+        <p:cNvGrpSpPr/>
+        <p:nvPr/>
+      </p:nvGrpSpPr>
+      <p:grpSpPr>
+        <a:xfrm>
+          <a:off x="0" y="0"/>
+          <a:ext cx="0" cy="0"/>
+          <a:chOff x="0" y="0"/>
+          <a:chExt cx="0" cy="0"/>
+        </a:xfrm>
+      </p:grpSpPr>
+      <p:sp>
+        <p:nvSpPr>
+          <p:cNvPr id="2" name="Rectangle 1">
+            <a:extLst>
+              <a:ext uri="{FF2B5EF4-FFF2-40B4-BE49-F238E27FC236}">
+                <a16:creationId xmlns:a16="http://schemas.microsoft.com/office/drawing/2014/main" id="{33512419-BA7D-7649-0142-0178817381BD}"/>
+              </a:ext>
+            </a:extLst>
+          </p:cNvPr>
+          <p:cNvSpPr/>
+          <p:nvPr/>
+        </p:nvSpPr>
+        <p:spPr>
+          <a:xfrm>
+            <a:off x="2601057" y="962757"/>
+            <a:ext cx="6989885" cy="4932485"/>
+          </a:xfrm>
+          <a:prstGeom prst="rect">
+            <a:avLst/>
+          </a:prstGeom>
+          <a:noFill/>
+          <a:ln w="38100">
+            <a:solidFill>
+              <a:schemeClr val="tx1"/>
+            </a:solidFill>
+          </a:ln>
+        </p:spPr>
+        <p:style>
+          <a:lnRef idx="2">
+            <a:schemeClr val="accent1">
+              <a:shade val="15000"/>
+            </a:schemeClr>
+          </a:lnRef>
+          <a:fillRef idx="1">
+            <a:schemeClr val="accent1"/>
+          </a:fillRef>
+          <a:effectRef idx="0">
+            <a:schemeClr val="accent1"/>
+          </a:effectRef>
+          <a:fontRef idx="minor">
+            <a:schemeClr val="lt1"/>
+          </a:fontRef>
+        </p:style>
+        <p:txBody>
+          <a:bodyPr rtlCol="0" anchor="ctr"/>
+          <a:lstStyle/>
+          <a:p>
+            <a:pPr algn="ctr"/>
+            <a:endParaRPr lang="en-GB">
+              <a:solidFill>
+                <a:schemeClr val="tx1"/>
+              </a:solidFill>
+            </a:endParaRPr>
+          </a:p>
+        </p:txBody>
+      </p:sp>
+      <p:cxnSp>
+        <p:nvCxnSpPr>
+          <p:cNvPr id="4" name="Straight Connector 3">
+            <a:extLst>
+              <a:ext uri="{FF2B5EF4-FFF2-40B4-BE49-F238E27FC236}">
+                <a16:creationId xmlns:a16="http://schemas.microsoft.com/office/drawing/2014/main" id="{A8752A5E-E080-8018-AC6F-B3E5598050B6}"/>
+              </a:ext>
+            </a:extLst>
+          </p:cNvPr>
+          <p:cNvCxnSpPr/>
+          <p:nvPr/>
+        </p:nvCxnSpPr>
+        <p:spPr>
+          <a:xfrm flipH="1">
+            <a:off x="2611315" y="1767254"/>
+            <a:ext cx="6972300" cy="0"/>
+          </a:xfrm>
+          <a:prstGeom prst="line">
+            <a:avLst/>
+          </a:prstGeom>
+          <a:ln w="38100">
+            <a:solidFill>
+              <a:schemeClr val="tx1"/>
+            </a:solidFill>
+          </a:ln>
+        </p:spPr>
+        <p:style>
+          <a:lnRef idx="2">
+            <a:schemeClr val="accent1"/>
+          </a:lnRef>
+          <a:fillRef idx="0">
+            <a:schemeClr val="accent1"/>
+          </a:fillRef>
+          <a:effectRef idx="1">
+            <a:schemeClr val="accent1"/>
+          </a:effectRef>
+          <a:fontRef idx="minor">
+            <a:schemeClr val="tx1"/>
+          </a:fontRef>
+        </p:style>
+      </p:cxnSp>
+      <p:sp>
+        <p:nvSpPr>
+          <p:cNvPr id="5" name="TextBox 4">
+            <a:extLst>
+              <a:ext uri="{FF2B5EF4-FFF2-40B4-BE49-F238E27FC236}">
+                <a16:creationId xmlns:a16="http://schemas.microsoft.com/office/drawing/2014/main" id="{968520E3-5DBB-FCC7-5630-285EB0D96352}"/>
+              </a:ext>
+            </a:extLst>
+          </p:cNvPr>
+          <p:cNvSpPr txBox="1"/>
+          <p:nvPr/>
+        </p:nvSpPr>
+        <p:spPr>
+          <a:xfrm>
+            <a:off x="2601057" y="962757"/>
+            <a:ext cx="6989885" cy="769441"/>
+          </a:xfrm>
+          <a:prstGeom prst="rect">
+            <a:avLst/>
+          </a:prstGeom>
+          <a:noFill/>
+        </p:spPr>
+        <p:txBody>
+          <a:bodyPr wrap="square" rtlCol="0">
+            <a:spAutoFit/>
+          </a:bodyPr>
+          <a:lstStyle/>
+          <a:p>
+            <a:pPr algn="ctr"/>
+            <a:r>
+              <a:rPr lang="en-GB" sz="4400" dirty="0"/>
+              <a:t>Screens</a:t>
+            </a:r>
+          </a:p>
+        </p:txBody>
+      </p:sp>
+      <p:sp>
+        <p:nvSpPr>
+          <p:cNvPr id="6" name="TextBox 5">
+            <a:extLst>
+              <a:ext uri="{FF2B5EF4-FFF2-40B4-BE49-F238E27FC236}">
+                <a16:creationId xmlns:a16="http://schemas.microsoft.com/office/drawing/2014/main" id="{D453E5BB-C6A3-EBAD-4D0F-DAC780070695}"/>
+              </a:ext>
+            </a:extLst>
+          </p:cNvPr>
+          <p:cNvSpPr txBox="1"/>
+          <p:nvPr/>
+        </p:nvSpPr>
+        <p:spPr>
+          <a:xfrm>
+            <a:off x="2601057" y="1802311"/>
+            <a:ext cx="6972300" cy="369332"/>
+          </a:xfrm>
+          <a:prstGeom prst="rect">
+            <a:avLst/>
+          </a:prstGeom>
+          <a:noFill/>
+        </p:spPr>
+        <p:txBody>
+          <a:bodyPr wrap="square" rtlCol="0">
+            <a:spAutoFit/>
+          </a:bodyPr>
+          <a:lstStyle/>
+          <a:p>
+            <a:r>
+              <a:rPr lang="en-GB" dirty="0" err="1"/>
+              <a:t>screenNo</a:t>
+            </a:r>
+            <a:r>
+              <a:rPr lang="en-GB" dirty="0"/>
+              <a:t>: Int</a:t>
+            </a:r>
+          </a:p>
+        </p:txBody>
+      </p:sp>
+      <p:cxnSp>
+        <p:nvCxnSpPr>
+          <p:cNvPr id="8" name="Straight Connector 7">
+            <a:extLst>
+              <a:ext uri="{FF2B5EF4-FFF2-40B4-BE49-F238E27FC236}">
+                <a16:creationId xmlns:a16="http://schemas.microsoft.com/office/drawing/2014/main" id="{26F4ECED-5310-42CA-D0F1-66A859E0E93E}"/>
+              </a:ext>
+            </a:extLst>
+          </p:cNvPr>
+          <p:cNvCxnSpPr/>
+          <p:nvPr/>
+        </p:nvCxnSpPr>
+        <p:spPr>
+          <a:xfrm>
+            <a:off x="2601057" y="3297121"/>
+            <a:ext cx="6982558" cy="0"/>
+          </a:xfrm>
+          <a:prstGeom prst="line">
+            <a:avLst/>
+          </a:prstGeom>
+          <a:ln w="38100">
+            <a:solidFill>
+              <a:schemeClr val="tx1"/>
+            </a:solidFill>
+          </a:ln>
+        </p:spPr>
+        <p:style>
+          <a:lnRef idx="2">
+            <a:schemeClr val="accent1"/>
+          </a:lnRef>
+          <a:fillRef idx="0">
+            <a:schemeClr val="accent1"/>
+          </a:fillRef>
+          <a:effectRef idx="1">
+            <a:schemeClr val="accent1"/>
+          </a:effectRef>
+          <a:fontRef idx="minor">
+            <a:schemeClr val="tx1"/>
+          </a:fontRef>
+        </p:style>
+      </p:cxnSp>
+      <p:sp>
+        <p:nvSpPr>
+          <p:cNvPr id="9" name="TextBox 8">
+            <a:extLst>
+              <a:ext uri="{FF2B5EF4-FFF2-40B4-BE49-F238E27FC236}">
+                <a16:creationId xmlns:a16="http://schemas.microsoft.com/office/drawing/2014/main" id="{58780B67-9917-873D-8508-499272D81813}"/>
+              </a:ext>
+            </a:extLst>
+          </p:cNvPr>
+          <p:cNvSpPr txBox="1"/>
+          <p:nvPr/>
+        </p:nvSpPr>
+        <p:spPr>
+          <a:xfrm>
+            <a:off x="2611315" y="3244340"/>
+            <a:ext cx="6962042" cy="1200329"/>
+          </a:xfrm>
+          <a:prstGeom prst="rect">
+            <a:avLst/>
+          </a:prstGeom>
+          <a:noFill/>
+        </p:spPr>
+        <p:txBody>
+          <a:bodyPr wrap="square" rtlCol="0">
+            <a:spAutoFit/>
+          </a:bodyPr>
+          <a:lstStyle/>
+          <a:p>
+            <a:r>
+              <a:rPr lang="en-GB" dirty="0"/>
+              <a:t>__</a:t>
+            </a:r>
+            <a:r>
+              <a:rPr lang="en-GB" dirty="0" err="1"/>
+              <a:t>init</a:t>
+            </a:r>
+            <a:r>
+              <a:rPr lang="en-GB" dirty="0"/>
+              <a:t>__</a:t>
+            </a:r>
+          </a:p>
+          <a:p>
+            <a:r>
+              <a:rPr lang="en-GB" dirty="0" err="1"/>
+              <a:t>draw_button</a:t>
+            </a:r>
+            <a:endParaRPr lang="en-GB" dirty="0"/>
+          </a:p>
+          <a:p>
+            <a:r>
+              <a:rPr lang="en-GB" dirty="0"/>
+              <a:t>menu</a:t>
+            </a:r>
+          </a:p>
+          <a:p>
+            <a:r>
+              <a:rPr lang="en-GB" dirty="0"/>
+              <a:t>instructions</a:t>
+            </a:r>
+          </a:p>
+        </p:txBody>
+      </p:sp>
+    </p:spTree>
+    <p:extLst>
+      <p:ext uri="{BB962C8B-B14F-4D97-AF65-F5344CB8AC3E}">
+        <p14:creationId xmlns:p14="http://schemas.microsoft.com/office/powerpoint/2010/main" val="2477395495"/>
+      </p:ext>
+    </p:extLst>
+  </p:cSld>
+  <p:clrMapOvr>
+    <a:masterClrMapping/>
+  </p:clrMapOvr>
+</p:sld>
+</file>
+
+<file path=ppt/slides/slide5.xml><?xml version="1.0" encoding="utf-8"?>
+<p:sld xmlns:a="http://schemas.openxmlformats.org/drawingml/2006/main" xmlns:r="http://schemas.openxmlformats.org/officeDocument/2006/relationships" xmlns:p="http://schemas.openxmlformats.org/presentationml/2006/main">
+  <p:cSld>
+    <p:spTree>
+      <p:nvGrpSpPr>
+        <p:cNvPr id="1" name="">
+          <a:extLst>
+            <a:ext uri="{FF2B5EF4-FFF2-40B4-BE49-F238E27FC236}">
+              <a16:creationId xmlns:a16="http://schemas.microsoft.com/office/drawing/2014/main" id="{5A860862-3E7B-4E10-88DE-207F3113FB58}"/>
+            </a:ext>
+          </a:extLst>
+        </p:cNvPr>
+        <p:cNvGrpSpPr/>
+        <p:nvPr/>
+      </p:nvGrpSpPr>
+      <p:grpSpPr>
+        <a:xfrm>
+          <a:off x="0" y="0"/>
+          <a:ext cx="0" cy="0"/>
+          <a:chOff x="0" y="0"/>
+          <a:chExt cx="0" cy="0"/>
+        </a:xfrm>
+      </p:grpSpPr>
+      <p:sp>
+        <p:nvSpPr>
+          <p:cNvPr id="2" name="Rectangle 1">
+            <a:extLst>
+              <a:ext uri="{FF2B5EF4-FFF2-40B4-BE49-F238E27FC236}">
+                <a16:creationId xmlns:a16="http://schemas.microsoft.com/office/drawing/2014/main" id="{ABDCBEC4-740E-AE67-2F12-2C5D1F35A879}"/>
+              </a:ext>
+            </a:extLst>
+          </p:cNvPr>
+          <p:cNvSpPr/>
+          <p:nvPr/>
+        </p:nvSpPr>
+        <p:spPr>
+          <a:xfrm>
+            <a:off x="2601057" y="962757"/>
+            <a:ext cx="6989885" cy="4932485"/>
+          </a:xfrm>
+          <a:prstGeom prst="rect">
+            <a:avLst/>
+          </a:prstGeom>
+          <a:noFill/>
+          <a:ln w="38100">
+            <a:solidFill>
+              <a:schemeClr val="tx1"/>
+            </a:solidFill>
+          </a:ln>
+        </p:spPr>
+        <p:style>
+          <a:lnRef idx="2">
+            <a:schemeClr val="accent1">
+              <a:shade val="15000"/>
+            </a:schemeClr>
+          </a:lnRef>
+          <a:fillRef idx="1">
+            <a:schemeClr val="accent1"/>
+          </a:fillRef>
+          <a:effectRef idx="0">
+            <a:schemeClr val="accent1"/>
+          </a:effectRef>
+          <a:fontRef idx="minor">
+            <a:schemeClr val="lt1"/>
+          </a:fontRef>
+        </p:style>
+        <p:txBody>
+          <a:bodyPr rtlCol="0" anchor="ctr"/>
+          <a:lstStyle/>
+          <a:p>
+            <a:pPr algn="ctr"/>
+            <a:endParaRPr lang="en-GB">
+              <a:solidFill>
+                <a:schemeClr val="tx1"/>
+              </a:solidFill>
+            </a:endParaRPr>
+          </a:p>
+        </p:txBody>
+      </p:sp>
+      <p:cxnSp>
+        <p:nvCxnSpPr>
+          <p:cNvPr id="4" name="Straight Connector 3">
+            <a:extLst>
+              <a:ext uri="{FF2B5EF4-FFF2-40B4-BE49-F238E27FC236}">
+                <a16:creationId xmlns:a16="http://schemas.microsoft.com/office/drawing/2014/main" id="{6F85EC7E-BE5B-4CB1-F146-8EE4535CAA3F}"/>
+              </a:ext>
+            </a:extLst>
+          </p:cNvPr>
+          <p:cNvCxnSpPr/>
+          <p:nvPr/>
+        </p:nvCxnSpPr>
+        <p:spPr>
+          <a:xfrm flipH="1">
+            <a:off x="2611315" y="1767254"/>
+            <a:ext cx="6972300" cy="0"/>
+          </a:xfrm>
+          <a:prstGeom prst="line">
+            <a:avLst/>
+          </a:prstGeom>
+          <a:ln w="38100">
+            <a:solidFill>
+              <a:schemeClr val="tx1"/>
+            </a:solidFill>
+          </a:ln>
+        </p:spPr>
+        <p:style>
+          <a:lnRef idx="2">
+            <a:schemeClr val="accent1"/>
+          </a:lnRef>
+          <a:fillRef idx="0">
+            <a:schemeClr val="accent1"/>
+          </a:fillRef>
+          <a:effectRef idx="1">
+            <a:schemeClr val="accent1"/>
+          </a:effectRef>
+          <a:fontRef idx="minor">
+            <a:schemeClr val="tx1"/>
+          </a:fontRef>
+        </p:style>
+      </p:cxnSp>
+      <p:sp>
+        <p:nvSpPr>
+          <p:cNvPr id="5" name="TextBox 4">
+            <a:extLst>
+              <a:ext uri="{FF2B5EF4-FFF2-40B4-BE49-F238E27FC236}">
+                <a16:creationId xmlns:a16="http://schemas.microsoft.com/office/drawing/2014/main" id="{2D5067F8-E353-5B56-BE54-096DD02AF218}"/>
+              </a:ext>
+            </a:extLst>
+          </p:cNvPr>
+          <p:cNvSpPr txBox="1"/>
+          <p:nvPr/>
+        </p:nvSpPr>
+        <p:spPr>
+          <a:xfrm>
+            <a:off x="2601057" y="962757"/>
+            <a:ext cx="6989885" cy="769441"/>
+          </a:xfrm>
+          <a:prstGeom prst="rect">
+            <a:avLst/>
+          </a:prstGeom>
+          <a:noFill/>
+        </p:spPr>
+        <p:txBody>
+          <a:bodyPr wrap="square" rtlCol="0">
+            <a:spAutoFit/>
+          </a:bodyPr>
+          <a:lstStyle/>
+          <a:p>
+            <a:pPr algn="ctr"/>
+            <a:r>
+              <a:rPr lang="en-GB" sz="4400" dirty="0"/>
+              <a:t>Graphics</a:t>
+            </a:r>
+          </a:p>
+        </p:txBody>
+      </p:sp>
+      <p:sp>
+        <p:nvSpPr>
+          <p:cNvPr id="6" name="TextBox 5">
+            <a:extLst>
+              <a:ext uri="{FF2B5EF4-FFF2-40B4-BE49-F238E27FC236}">
+                <a16:creationId xmlns:a16="http://schemas.microsoft.com/office/drawing/2014/main" id="{1B8DE199-A199-E0EB-0E7E-9561E23C7AB0}"/>
+              </a:ext>
+            </a:extLst>
+          </p:cNvPr>
+          <p:cNvSpPr txBox="1"/>
+          <p:nvPr/>
+        </p:nvSpPr>
+        <p:spPr>
+          <a:xfrm>
+            <a:off x="2601057" y="1802311"/>
+            <a:ext cx="6972300" cy="369332"/>
+          </a:xfrm>
+          <a:prstGeom prst="rect">
+            <a:avLst/>
+          </a:prstGeom>
+          <a:noFill/>
+        </p:spPr>
+        <p:txBody>
+          <a:bodyPr wrap="square" rtlCol="0">
+            <a:spAutoFit/>
+          </a:bodyPr>
+          <a:lstStyle/>
+          <a:p>
+            <a:r>
+              <a:rPr lang="en-GB" dirty="0"/>
+              <a:t>screen: Screen from Main class</a:t>
+            </a:r>
+          </a:p>
+        </p:txBody>
+      </p:sp>
+      <p:cxnSp>
+        <p:nvCxnSpPr>
+          <p:cNvPr id="8" name="Straight Connector 7">
+            <a:extLst>
+              <a:ext uri="{FF2B5EF4-FFF2-40B4-BE49-F238E27FC236}">
+                <a16:creationId xmlns:a16="http://schemas.microsoft.com/office/drawing/2014/main" id="{959E96D2-CFFA-A767-8D21-B13C3A3889B8}"/>
+              </a:ext>
+            </a:extLst>
+          </p:cNvPr>
+          <p:cNvCxnSpPr/>
+          <p:nvPr/>
+        </p:nvCxnSpPr>
+        <p:spPr>
+          <a:xfrm>
+            <a:off x="2601057" y="3297121"/>
+            <a:ext cx="6982558" cy="0"/>
+          </a:xfrm>
+          <a:prstGeom prst="line">
+            <a:avLst/>
+          </a:prstGeom>
+          <a:ln w="38100">
+            <a:solidFill>
+              <a:schemeClr val="tx1"/>
+            </a:solidFill>
+          </a:ln>
+        </p:spPr>
+        <p:style>
+          <a:lnRef idx="2">
+            <a:schemeClr val="accent1"/>
+          </a:lnRef>
+          <a:fillRef idx="0">
+            <a:schemeClr val="accent1"/>
+          </a:fillRef>
+          <a:effectRef idx="1">
+            <a:schemeClr val="accent1"/>
+          </a:effectRef>
+          <a:fontRef idx="minor">
+            <a:schemeClr val="tx1"/>
+          </a:fontRef>
+        </p:style>
+      </p:cxnSp>
+      <p:sp>
+        <p:nvSpPr>
+          <p:cNvPr id="9" name="TextBox 8">
+            <a:extLst>
+              <a:ext uri="{FF2B5EF4-FFF2-40B4-BE49-F238E27FC236}">
+                <a16:creationId xmlns:a16="http://schemas.microsoft.com/office/drawing/2014/main" id="{A5B575CD-9073-AE84-CBA4-C5BE0A1D7D59}"/>
+              </a:ext>
+            </a:extLst>
+          </p:cNvPr>
+          <p:cNvSpPr txBox="1"/>
+          <p:nvPr/>
+        </p:nvSpPr>
+        <p:spPr>
+          <a:xfrm>
+            <a:off x="2611315" y="3244340"/>
+            <a:ext cx="6962042" cy="1200329"/>
+          </a:xfrm>
+          <a:prstGeom prst="rect">
+            <a:avLst/>
+          </a:prstGeom>
+          <a:noFill/>
+        </p:spPr>
+        <p:txBody>
+          <a:bodyPr wrap="square" rtlCol="0">
+            <a:spAutoFit/>
+          </a:bodyPr>
+          <a:lstStyle/>
+          <a:p>
+            <a:r>
+              <a:rPr lang="en-GB" dirty="0" err="1"/>
+              <a:t>draw_squares</a:t>
+            </a:r>
+            <a:endParaRPr lang="en-GB" dirty="0"/>
+          </a:p>
+          <a:p>
+            <a:r>
+              <a:rPr lang="en-GB" dirty="0" err="1"/>
+              <a:t>draw_pieces</a:t>
+            </a:r>
+            <a:endParaRPr lang="en-GB" dirty="0"/>
+          </a:p>
+          <a:p>
+            <a:r>
+              <a:rPr lang="en-GB" dirty="0" err="1"/>
+              <a:t>show_highlights</a:t>
+            </a:r>
+            <a:endParaRPr lang="en-GB" dirty="0"/>
+          </a:p>
+          <a:p>
+            <a:r>
+              <a:rPr lang="en-GB" dirty="0" err="1"/>
+              <a:t>pawn_</a:t>
+            </a:r>
+            <a:r>
+              <a:rPr lang="en-GB" err="1"/>
+              <a:t>promotion</a:t>
+            </a:r>
+            <a:r>
+              <a:rPr lang="en-GB"/>
+              <a:t>_square</a:t>
+            </a:r>
+            <a:endParaRPr lang="en-GB" dirty="0"/>
+          </a:p>
+        </p:txBody>
+      </p:sp>
+    </p:spTree>
+    <p:extLst>
+      <p:ext uri="{BB962C8B-B14F-4D97-AF65-F5344CB8AC3E}">
+        <p14:creationId xmlns:p14="http://schemas.microsoft.com/office/powerpoint/2010/main" val="1535615276"/>
       </p:ext>
     </p:extLst>
   </p:cSld>

</xml_diff>